<commit_message>
Update Lecture 03 2020
</commit_message>
<xml_diff>
--- a/Lecture Note/2019/Lecture 04/Lecture 04.pptx
+++ b/Lecture Note/2019/Lecture 04/Lecture 04.pptx
@@ -57,28 +57,28 @@
   <p:notesSz cx="6858000" cy="9144000"/>
   <p:embeddedFontLst>
     <p:embeddedFont>
-      <p:font typeface="a옛날목욕탕L" panose="02020600000000000000" pitchFamily="18" charset="-127"/>
-      <p:regular r:id="rId49"/>
+      <p:font typeface="나눔스퀘어라운드 Bold" panose="020B0600000101010101" charset="-127"/>
+      <p:bold r:id="rId49"/>
+    </p:embeddedFont>
+    <p:embeddedFont>
+      <p:font typeface="메이플스토리" panose="020B0600000101010101" charset="-127"/>
+      <p:regular r:id="rId50"/>
+      <p:bold r:id="rId51"/>
     </p:embeddedFont>
     <p:embeddedFont>
       <p:font typeface="a옛날목욕탕B" panose="02020600000000000000" pitchFamily="18" charset="-127"/>
-      <p:regular r:id="rId50"/>
+      <p:regular r:id="rId52"/>
+    </p:embeddedFont>
+    <p:embeddedFont>
+      <p:font typeface="a옛날목욕탕L" panose="02020600000000000000" pitchFamily="18" charset="-127"/>
+      <p:regular r:id="rId53"/>
     </p:embeddedFont>
     <p:embeddedFont>
       <p:font typeface="Cambria Math" panose="02040503050406030204" pitchFamily="18" charset="0"/>
-      <p:regular r:id="rId51"/>
-    </p:embeddedFont>
-    <p:embeddedFont>
-      <p:font typeface="나눔스퀘어라운드 Bold" panose="020B0600000101010101" pitchFamily="50" charset="-127"/>
-      <p:bold r:id="rId52"/>
+      <p:regular r:id="rId54"/>
     </p:embeddedFont>
     <p:embeddedFont>
       <p:font typeface="맑은 고딕" panose="020B0503020000020004" pitchFamily="50" charset="-127"/>
-      <p:regular r:id="rId53"/>
-      <p:bold r:id="rId54"/>
-    </p:embeddedFont>
-    <p:embeddedFont>
-      <p:font typeface="메이플스토리" panose="02000300000000000000" pitchFamily="2" charset="-127"/>
       <p:regular r:id="rId55"/>
       <p:bold r:id="rId56"/>
     </p:embeddedFont>
@@ -3641,7 +3641,7 @@
           <a:p>
             <a:fld id="{516BFB65-1ABC-4601-A567-223D74EE9DF8}" type="datetimeFigureOut">
               <a:rPr lang="ko-KR" altLang="en-US" smtClean="0"/>
-              <a:t>2019-11-29</a:t>
+              <a:t>2020-01-28</a:t>
             </a:fld>
             <a:endParaRPr lang="ko-KR" altLang="en-US"/>
           </a:p>
@@ -3809,7 +3809,7 @@
           <a:p>
             <a:fld id="{516BFB65-1ABC-4601-A567-223D74EE9DF8}" type="datetimeFigureOut">
               <a:rPr lang="ko-KR" altLang="en-US" smtClean="0"/>
-              <a:t>2019-11-29</a:t>
+              <a:t>2020-01-28</a:t>
             </a:fld>
             <a:endParaRPr lang="ko-KR" altLang="en-US"/>
           </a:p>
@@ -3987,7 +3987,7 @@
           <a:p>
             <a:fld id="{516BFB65-1ABC-4601-A567-223D74EE9DF8}" type="datetimeFigureOut">
               <a:rPr lang="ko-KR" altLang="en-US" smtClean="0"/>
-              <a:t>2019-11-29</a:t>
+              <a:t>2020-01-28</a:t>
             </a:fld>
             <a:endParaRPr lang="ko-KR" altLang="en-US"/>
           </a:p>
@@ -4155,7 +4155,7 @@
           <a:p>
             <a:fld id="{516BFB65-1ABC-4601-A567-223D74EE9DF8}" type="datetimeFigureOut">
               <a:rPr lang="ko-KR" altLang="en-US" smtClean="0"/>
-              <a:t>2019-11-29</a:t>
+              <a:t>2020-01-28</a:t>
             </a:fld>
             <a:endParaRPr lang="ko-KR" altLang="en-US"/>
           </a:p>
@@ -4400,7 +4400,7 @@
           <a:p>
             <a:fld id="{516BFB65-1ABC-4601-A567-223D74EE9DF8}" type="datetimeFigureOut">
               <a:rPr lang="ko-KR" altLang="en-US" smtClean="0"/>
-              <a:t>2019-11-29</a:t>
+              <a:t>2020-01-28</a:t>
             </a:fld>
             <a:endParaRPr lang="ko-KR" altLang="en-US"/>
           </a:p>
@@ -4629,7 +4629,7 @@
           <a:p>
             <a:fld id="{516BFB65-1ABC-4601-A567-223D74EE9DF8}" type="datetimeFigureOut">
               <a:rPr lang="ko-KR" altLang="en-US" smtClean="0"/>
-              <a:t>2019-11-29</a:t>
+              <a:t>2020-01-28</a:t>
             </a:fld>
             <a:endParaRPr lang="ko-KR" altLang="en-US"/>
           </a:p>
@@ -4993,7 +4993,7 @@
           <a:p>
             <a:fld id="{516BFB65-1ABC-4601-A567-223D74EE9DF8}" type="datetimeFigureOut">
               <a:rPr lang="ko-KR" altLang="en-US" smtClean="0"/>
-              <a:t>2019-11-29</a:t>
+              <a:t>2020-01-28</a:t>
             </a:fld>
             <a:endParaRPr lang="ko-KR" altLang="en-US"/>
           </a:p>
@@ -5110,7 +5110,7 @@
           <a:p>
             <a:fld id="{516BFB65-1ABC-4601-A567-223D74EE9DF8}" type="datetimeFigureOut">
               <a:rPr lang="ko-KR" altLang="en-US" smtClean="0"/>
-              <a:t>2019-11-29</a:t>
+              <a:t>2020-01-28</a:t>
             </a:fld>
             <a:endParaRPr lang="ko-KR" altLang="en-US"/>
           </a:p>
@@ -5205,7 +5205,7 @@
           <a:p>
             <a:fld id="{516BFB65-1ABC-4601-A567-223D74EE9DF8}" type="datetimeFigureOut">
               <a:rPr lang="ko-KR" altLang="en-US" smtClean="0"/>
-              <a:t>2019-11-29</a:t>
+              <a:t>2020-01-28</a:t>
             </a:fld>
             <a:endParaRPr lang="ko-KR" altLang="en-US"/>
           </a:p>
@@ -5480,7 +5480,7 @@
           <a:p>
             <a:fld id="{516BFB65-1ABC-4601-A567-223D74EE9DF8}" type="datetimeFigureOut">
               <a:rPr lang="ko-KR" altLang="en-US" smtClean="0"/>
-              <a:t>2019-11-29</a:t>
+              <a:t>2020-01-28</a:t>
             </a:fld>
             <a:endParaRPr lang="ko-KR" altLang="en-US"/>
           </a:p>
@@ -5732,7 +5732,7 @@
           <a:p>
             <a:fld id="{516BFB65-1ABC-4601-A567-223D74EE9DF8}" type="datetimeFigureOut">
               <a:rPr lang="ko-KR" altLang="en-US" smtClean="0"/>
-              <a:t>2019-11-29</a:t>
+              <a:t>2020-01-28</a:t>
             </a:fld>
             <a:endParaRPr lang="ko-KR" altLang="en-US"/>
           </a:p>
@@ -5943,7 +5943,7 @@
           <a:p>
             <a:fld id="{516BFB65-1ABC-4601-A567-223D74EE9DF8}" type="datetimeFigureOut">
               <a:rPr lang="ko-KR" altLang="en-US" smtClean="0"/>
-              <a:t>2019-11-29</a:t>
+              <a:t>2020-01-28</a:t>
             </a:fld>
             <a:endParaRPr lang="ko-KR" altLang="en-US"/>
           </a:p>
@@ -8200,7 +8200,7 @@
         </p:blipFill>
         <p:spPr bwMode="auto">
           <a:xfrm>
-            <a:off x="918082" y="2653371"/>
+            <a:off x="915731" y="2639924"/>
             <a:ext cx="6886771" cy="3945934"/>
           </a:xfrm>
           <a:prstGeom prst="rect">

</xml_diff>